<commit_message>
Uppdaterat tävlingsflowchart bilden o lagt in den i presentationen
</commit_message>
<xml_diff>
--- a/docs/TSEA29-presentation-v.01.pptx
+++ b/docs/TSEA29-presentation-v.01.pptx
@@ -156,6 +156,32 @@
 </p:presentation>
 </file>
 
+<file path=ppt/commentAuthors.xml><?xml version="1.0" encoding="utf-8"?>
+<p:cmAuthorLst xmlns:a="http://schemas.openxmlformats.org/drawingml/2006/main" xmlns:r="http://schemas.openxmlformats.org/officeDocument/2006/relationships" xmlns:p="http://schemas.openxmlformats.org/presentationml/2006/main">
+  <p:cmAuthor id="1" name="Johan Olin" initials="JO" lastIdx="2" clrIdx="0">
+    <p:extLst>
+      <p:ext uri="{19B8F6BF-5375-455C-9EA6-DF929625EA0E}">
+        <p15:presenceInfo xmlns:p15="http://schemas.microsoft.com/office/powerpoint/2012/main" userId="f5ee6c3b969423b6" providerId="Windows Live"/>
+      </p:ext>
+    </p:extLst>
+  </p:cmAuthor>
+</p:cmAuthorLst>
+</file>
+
+<file path=ppt/comments/comment1.xml><?xml version="1.0" encoding="utf-8"?>
+<p:cmLst xmlns:a="http://schemas.openxmlformats.org/drawingml/2006/main" xmlns:r="http://schemas.openxmlformats.org/officeDocument/2006/relationships" xmlns:p="http://schemas.openxmlformats.org/presentationml/2006/main">
+  <p:cm authorId="1" dt="2015-12-18T00:05:02.284" idx="2">
+    <p:pos x="10" y="10"/>
+    <p:text>Om vi har tid kan man beskriva detta i en simplfieread version</p:text>
+    <p:extLst>
+      <p:ext uri="{C676402C-5697-4E1C-873F-D02D1690AC5C}">
+        <p15:threadingInfo xmlns:p15="http://schemas.microsoft.com/office/powerpoint/2012/main" timeZoneBias="-60"/>
+      </p:ext>
+    </p:extLst>
+  </p:cm>
+</p:cmLst>
+</file>
+
 <file path=ppt/handoutMasters/handoutMaster1.xml><?xml version="1.0" encoding="utf-8"?>
 <p:handoutMaster xmlns:a="http://schemas.openxmlformats.org/drawingml/2006/main" xmlns:r="http://schemas.openxmlformats.org/officeDocument/2006/relationships" xmlns:p="http://schemas.openxmlformats.org/presentationml/2006/main">
   <p:cSld>
@@ -794,6 +820,73 @@
     <p:extLst>
       <p:ext uri="{BB962C8B-B14F-4D97-AF65-F5344CB8AC3E}">
         <p14:creationId xmlns:p14="http://schemas.microsoft.com/office/powerpoint/2010/main" val="4207603223"/>
+      </p:ext>
+    </p:extLst>
+  </p:cSld>
+  <p:clrMapOvr>
+    <a:masterClrMapping/>
+  </p:clrMapOvr>
+</p:notes>
+</file>
+
+<file path=ppt/notesSlides/notesSlide3.xml><?xml version="1.0" encoding="utf-8"?>
+<p:notes xmlns:a="http://schemas.openxmlformats.org/drawingml/2006/main" xmlns:r="http://schemas.openxmlformats.org/officeDocument/2006/relationships" xmlns:p="http://schemas.openxmlformats.org/presentationml/2006/main">
+  <p:cSld>
+    <p:spTree>
+      <p:nvGrpSpPr>
+        <p:cNvPr id="1" name=""/>
+        <p:cNvGrpSpPr/>
+        <p:nvPr/>
+      </p:nvGrpSpPr>
+      <p:grpSpPr>
+        <a:xfrm>
+          <a:off x="0" y="0"/>
+          <a:ext cx="0" cy="0"/>
+          <a:chOff x="0" y="0"/>
+          <a:chExt cx="0" cy="0"/>
+        </a:xfrm>
+      </p:grpSpPr>
+      <p:sp>
+        <p:nvSpPr>
+          <p:cNvPr id="2" name="Platshållare för bildobjekt 1"/>
+          <p:cNvSpPr>
+            <a:spLocks noGrp="1" noRot="1" noChangeAspect="1"/>
+          </p:cNvSpPr>
+          <p:nvPr>
+            <p:ph type="sldImg"/>
+          </p:nvPr>
+        </p:nvSpPr>
+        <p:spPr/>
+      </p:sp>
+      <p:sp>
+        <p:nvSpPr>
+          <p:cNvPr id="3" name="Platshållare för anteckningar 2"/>
+          <p:cNvSpPr>
+            <a:spLocks noGrp="1"/>
+          </p:cNvSpPr>
+          <p:nvPr>
+            <p:ph type="body" idx="1"/>
+          </p:nvPr>
+        </p:nvSpPr>
+        <p:spPr/>
+        <p:txBody>
+          <a:bodyPr/>
+          <a:lstStyle/>
+          <a:p>
+            <a:r>
+              <a:rPr lang="sv-SE" dirty="0" smtClean="0"/>
+              <a:t>Om vi har tid kan man beskriva detta i en simplifierad version</a:t>
+            </a:r>
+          </a:p>
+          <a:p>
+            <a:endParaRPr lang="en-US" dirty="0"/>
+          </a:p>
+        </p:txBody>
+      </p:sp>
+    </p:spTree>
+    <p:extLst>
+      <p:ext uri="{BB962C8B-B14F-4D97-AF65-F5344CB8AC3E}">
+        <p14:creationId xmlns:p14="http://schemas.microsoft.com/office/powerpoint/2010/main" val="1774050290"/>
       </p:ext>
     </p:extLst>
   </p:cSld>
@@ -4841,7 +4934,7 @@
           <p:nvPr/>
         </p:nvPicPr>
         <p:blipFill>
-          <a:blip r:embed="rId2">
+          <a:blip r:embed="rId3">
             <a:extLst>
               <a:ext uri="{28A0092B-C50C-407E-A947-70E740481C1C}">
                 <a14:useLocalDpi xmlns:a14="http://schemas.microsoft.com/office/drawing/2010/main" val="0"/>
@@ -4864,54 +4957,32 @@
       </p:pic>
       <p:pic>
         <p:nvPicPr>
-          <p:cNvPr id="1026" name="Picture 2" descr="tävlings flowchart.png"/>
+          <p:cNvPr id="7" name="Bildobjekt 6"/>
           <p:cNvPicPr>
-            <a:picLocks noChangeAspect="1" noChangeArrowheads="1"/>
+            <a:picLocks noChangeAspect="1"/>
           </p:cNvPicPr>
           <p:nvPr/>
         </p:nvPicPr>
         <p:blipFill>
-          <a:blip r:embed="rId3">
+          <a:blip r:embed="rId4">
             <a:extLst>
               <a:ext uri="{28A0092B-C50C-407E-A947-70E740481C1C}">
                 <a14:useLocalDpi xmlns:a14="http://schemas.microsoft.com/office/drawing/2010/main" val="0"/>
               </a:ext>
             </a:extLst>
           </a:blip>
-          <a:srcRect/>
           <a:stretch>
             <a:fillRect/>
           </a:stretch>
         </p:blipFill>
-        <p:spPr bwMode="auto">
+        <p:spPr>
           <a:xfrm>
-            <a:off x="2762040" y="1417638"/>
-            <a:ext cx="6667919" cy="5073026"/>
+            <a:off x="2533153" y="1332729"/>
+            <a:ext cx="7125694" cy="5525271"/>
           </a:xfrm>
           <a:prstGeom prst="rect">
             <a:avLst/>
           </a:prstGeom>
-          <a:ln w="228600" cap="sq" cmpd="thickThin">
-            <a:solidFill>
-              <a:srgbClr val="000000"/>
-            </a:solidFill>
-            <a:prstDash val="solid"/>
-            <a:miter lim="800000"/>
-          </a:ln>
-          <a:effectLst>
-            <a:innerShdw blurRad="76200">
-              <a:srgbClr val="000000"/>
-            </a:innerShdw>
-          </a:effectLst>
-          <a:extLst>
-            <a:ext uri="{909E8E84-426E-40DD-AFC4-6F175D3DCCD1}">
-              <a14:hiddenFill xmlns:a14="http://schemas.microsoft.com/office/drawing/2010/main">
-                <a:solidFill>
-                  <a:srgbClr val="FFFFFF"/>
-                </a:solidFill>
-              </a14:hiddenFill>
-            </a:ext>
-          </a:extLst>
         </p:spPr>
       </p:pic>
     </p:spTree>
@@ -8340,11 +8411,7 @@
             </a:r>
             <a:r>
               <a:rPr lang="sv-SE" smtClean="0"/>
-              <a:t>till </a:t>
-            </a:r>
-            <a:r>
-              <a:rPr lang="sv-SE" smtClean="0"/>
-              <a:t>persondator</a:t>
+              <a:t>till persondator</a:t>
             </a:r>
             <a:endParaRPr lang="sv-SE" dirty="0" smtClean="0"/>
           </a:p>

</xml_diff>